<commit_message>
finish code for mac
</commit_message>
<xml_diff>
--- a/20160510.pptx
+++ b/20160510.pptx
@@ -10,6 +10,14 @@
   <p:sldIdLst>
     <p:sldId id="290" r:id="rId2"/>
     <p:sldId r:id="rId8" id="256"/>
+    <p:sldId r:id="rId9" id="257"/>
+    <p:sldId r:id="rId10" id="258"/>
+    <p:sldId r:id="rId11" id="259"/>
+    <p:sldId r:id="rId12" id="260"/>
+    <p:sldId r:id="rId13" id="261"/>
+    <p:sldId r:id="rId14" id="262"/>
+    <p:sldId r:id="rId15" id="263"/>
+    <p:sldId r:id="rId16" id="264"/>
   </p:sldIdLst>
   <p:sldSz cx="9144000" cy="6858000" type="screen4x3"/>
   <p:notesSz cx="6858000" cy="9144000"/>
@@ -3446,14 +3454,14 @@
       </p:pic>
       <p:sp>
         <p:nvSpPr>
-          <p:cNvPr id="6" name="TextBox 5"/>
+          <p:cNvPr id="3" name="TextBox 2"/>
           <p:cNvSpPr txBox="1"/>
           <p:nvPr/>
         </p:nvSpPr>
         <p:spPr>
           <a:xfrm>
-            <a:off x="127934" y="1484784"/>
-            <a:ext cx="8892000" cy="3938400"/>
+            <a:off x="129600" y="1224000"/>
+            <a:ext cx="8892000" cy="1080000"/>
           </a:xfrm>
           <a:prstGeom prst="rect">
             <a:avLst/>
@@ -3461,25 +3469,25 @@
           <a:noFill/>
         </p:spPr>
         <p:txBody>
-          <a:bodyPr wrap="square" rtlCol="0">
+          <a:bodyPr wrap="none">
             <a:spAutoFit/>
           </a:bodyPr>
           <a:lstStyle/>
+          <a:p/>
           <a:p>
             <a:pPr algn="ctr">
               <a:lnSpc>
                 <a:spcPts val="7500"/>
               </a:lnSpc>
+              <a:defRPr sz="5600" b="0">
+                <a:solidFill>
+                  <a:srgbClr val="FDBF2D"/>
+                </a:solidFill>
+                <a:latin typeface="Microsoft YaHei"/>
+              </a:defRPr>
             </a:pPr>
             <a:r>
-              <a:rPr lang="en-US" altLang="zh-CN" sz="5600" dirty="0" smtClean="0">
-                <a:solidFill>
-                  <a:srgbClr val="FFC000"/>
-                </a:solidFill>
-                <a:latin typeface="微软雅黑" panose="020B0503020204020204" pitchFamily="34" charset="-122"/>
-                <a:ea typeface="微软雅黑" panose="020B0503020204020204" pitchFamily="34" charset="-122"/>
-              </a:rPr>
-              <a:t>Test</a:t>
+              <a:t>阿爸阿爸父阿爸阿爸父</a:t>
             </a:r>
           </a:p>
           <a:p>
@@ -3487,16 +3495,15 @@
               <a:lnSpc>
                 <a:spcPts val="7500"/>
               </a:lnSpc>
+              <a:defRPr sz="5600" b="0">
+                <a:solidFill>
+                  <a:srgbClr val="FDBF2D"/>
+                </a:solidFill>
+                <a:latin typeface="Microsoft YaHei"/>
+              </a:defRPr>
             </a:pPr>
             <a:r>
-              <a:rPr lang="en-US" altLang="zh-CN" sz="5600" dirty="0" smtClean="0">
-                <a:solidFill>
-                  <a:srgbClr val="FFC000"/>
-                </a:solidFill>
-                <a:latin typeface="微软雅黑" panose="020B0503020204020204" pitchFamily="34" charset="-122"/>
-                <a:ea typeface="微软雅黑" panose="020B0503020204020204" pitchFamily="34" charset="-122"/>
-              </a:rPr>
-              <a:t>Test</a:t>
+              <a:t>紧紧拥抱我深深注视</a:t>
             </a:r>
           </a:p>
           <a:p>
@@ -3504,64 +3511,29 @@
               <a:lnSpc>
                 <a:spcPts val="7500"/>
               </a:lnSpc>
+              <a:defRPr sz="5600" b="0">
+                <a:solidFill>
+                  <a:srgbClr val="FDBF2D"/>
+                </a:solidFill>
+                <a:latin typeface="Microsoft YaHei"/>
+              </a:defRPr>
             </a:pPr>
             <a:r>
-              <a:rPr lang="en-US" altLang="zh-CN" sz="5600" dirty="0" smtClean="0">
-                <a:solidFill>
-                  <a:srgbClr val="FFC000"/>
-                </a:solidFill>
-                <a:latin typeface="微软雅黑" panose="020B0503020204020204" pitchFamily="34" charset="-122"/>
-                <a:ea typeface="微软雅黑" panose="020B0503020204020204" pitchFamily="34" charset="-122"/>
-              </a:rPr>
-              <a:t>Test</a:t>
-            </a:r>
-          </a:p>
-          <a:p>
-            <a:pPr algn="ctr">
-              <a:lnSpc>
-                <a:spcPts val="7500"/>
-              </a:lnSpc>
-            </a:pPr>
-            <a:r>
-              <a:rPr lang="en-US" altLang="zh-CN" sz="5600" dirty="0">
-                <a:solidFill>
-                  <a:srgbClr val="FFC000"/>
-                </a:solidFill>
-                <a:latin typeface="微软雅黑" panose="020B0503020204020204" pitchFamily="34" charset="-122"/>
-                <a:ea typeface="微软雅黑" panose="020B0503020204020204" pitchFamily="34" charset="-122"/>
-              </a:rPr>
-              <a:t>T</a:t>
-            </a:r>
-            <a:r>
-              <a:rPr lang="en-US" altLang="zh-CN" sz="5600" dirty="0" smtClean="0">
-                <a:solidFill>
-                  <a:srgbClr val="FFC000"/>
-                </a:solidFill>
-                <a:latin typeface="微软雅黑" panose="020B0503020204020204" pitchFamily="34" charset="-122"/>
-                <a:ea typeface="微软雅黑" panose="020B0503020204020204" pitchFamily="34" charset="-122"/>
-              </a:rPr>
-              <a:t>est</a:t>
-            </a:r>
-            <a:endParaRPr lang="zh-CN" altLang="en-US" sz="5600" dirty="0">
-              <a:solidFill>
-                <a:srgbClr val="FFC000"/>
-              </a:solidFill>
-              <a:latin typeface="微软雅黑" panose="020B0503020204020204" pitchFamily="34" charset="-122"/>
-              <a:ea typeface="微软雅黑" panose="020B0503020204020204" pitchFamily="34" charset="-122"/>
-            </a:endParaRPr>
-          </a:p>
-        </p:txBody>
-      </p:sp>
-      <p:sp>
-        <p:nvSpPr>
-          <p:cNvPr id="8" name="TextBox 7"/>
+              <a:t>我的阿爸阿爸父</a:t>
+            </a:r>
+          </a:p>
+        </p:txBody>
+      </p:sp>
+      <p:sp>
+        <p:nvSpPr>
+          <p:cNvPr id="4" name="TextBox 3"/>
           <p:cNvSpPr txBox="1"/>
           <p:nvPr/>
         </p:nvSpPr>
         <p:spPr>
           <a:xfrm>
-            <a:off x="0" y="6488668"/>
-            <a:ext cx="9053657" cy="369332"/>
+            <a:off x="0" y="6480000"/>
+            <a:ext cx="9054000" cy="370800"/>
           </a:xfrm>
           <a:prstGeom prst="rect">
             <a:avLst/>
@@ -3569,29 +3541,22 @@
           <a:noFill/>
         </p:spPr>
         <p:txBody>
-          <a:bodyPr wrap="square" rtlCol="0">
+          <a:bodyPr wrap="none">
             <a:spAutoFit/>
           </a:bodyPr>
           <a:lstStyle/>
           <a:p>
-            <a:pPr lvl="0" algn="r"/>
-            <a:r>
-              <a:rPr lang="en-US" altLang="zh-CN" b="1" dirty="0" err="1" smtClean="0">
-                <a:solidFill>
-                  <a:srgbClr val="FFC000"/>
-                </a:solidFill>
-                <a:latin typeface="微软雅黑" panose="020B0503020204020204" pitchFamily="34" charset="-122"/>
-                <a:ea typeface="微软雅黑" panose="020B0503020204020204" pitchFamily="34" charset="-122"/>
-              </a:rPr>
-              <a:t>testtestsetstst</a:t>
-            </a:r>
-            <a:endParaRPr lang="zh-CN" altLang="en-US" b="1" dirty="0">
-              <a:solidFill>
-                <a:srgbClr val="FFC000"/>
-              </a:solidFill>
-              <a:latin typeface="微软雅黑" panose="020B0503020204020204" pitchFamily="34" charset="-122"/>
-              <a:ea typeface="微软雅黑" panose="020B0503020204020204" pitchFamily="34" charset="-122"/>
-            </a:endParaRPr>
+            <a:pPr algn="r">
+              <a:defRPr sz="2000" b="1">
+                <a:solidFill>
+                  <a:srgbClr val="FDBF2D"/>
+                </a:solidFill>
+                <a:latin typeface="Microsoft YaHei"/>
+              </a:defRPr>
+            </a:pPr>
+            <a:r>
+              <a:t>阿爸阿爸父</a:t>
+            </a:r>
           </a:p>
         </p:txBody>
       </p:sp>
@@ -3615,6 +3580,148 @@
 </p:sld>
 </file>
 
+<file path=ppt/slides/slide10.xml><?xml version="1.0" encoding="utf-8"?>
+<p:sld xmlns:a="http://schemas.openxmlformats.org/drawingml/2006/main" xmlns:p="http://schemas.openxmlformats.org/presentationml/2006/main" xmlns:r="http://schemas.openxmlformats.org/officeDocument/2006/relationships">
+  <p:cSld>
+    <p:spTree>
+      <p:nvGrpSpPr>
+        <p:cNvPr id="1" name=""/>
+        <p:cNvGrpSpPr/>
+        <p:nvPr/>
+      </p:nvGrpSpPr>
+      <p:grpSpPr/>
+      <p:sp>
+        <p:nvSpPr>
+          <p:cNvPr id="2" name="TextBox 1"/>
+          <p:cNvSpPr txBox="1"/>
+          <p:nvPr/>
+        </p:nvSpPr>
+        <p:spPr>
+          <a:xfrm>
+            <a:off x="129600" y="1224000"/>
+            <a:ext cx="8892000" cy="1080000"/>
+          </a:xfrm>
+          <a:prstGeom prst="rect">
+            <a:avLst/>
+          </a:prstGeom>
+          <a:noFill/>
+        </p:spPr>
+        <p:txBody>
+          <a:bodyPr wrap="none">
+            <a:spAutoFit/>
+          </a:bodyPr>
+          <a:lstStyle/>
+          <a:p/>
+          <a:p>
+            <a:pPr algn="ctr">
+              <a:lnSpc>
+                <a:spcPts val="7500"/>
+              </a:lnSpc>
+              <a:defRPr sz="5600" b="0">
+                <a:solidFill>
+                  <a:srgbClr val="FDBF2D"/>
+                </a:solidFill>
+                <a:latin typeface="Microsoft YaHei"/>
+              </a:defRPr>
+            </a:pPr>
+            <a:r>
+              <a:t>惟有主的话永长存</a:t>
+            </a:r>
+          </a:p>
+          <a:p>
+            <a:pPr algn="ctr">
+              <a:lnSpc>
+                <a:spcPts val="7500"/>
+              </a:lnSpc>
+              <a:defRPr sz="5600" b="0">
+                <a:solidFill>
+                  <a:srgbClr val="FDBF2D"/>
+                </a:solidFill>
+                <a:latin typeface="Microsoft YaHei"/>
+              </a:defRPr>
+            </a:pPr>
+            <a:r>
+              <a:t>惟有主的话永长存</a:t>
+            </a:r>
+          </a:p>
+          <a:p>
+            <a:pPr algn="ctr">
+              <a:lnSpc>
+                <a:spcPts val="7500"/>
+              </a:lnSpc>
+              <a:defRPr sz="5600" b="0">
+                <a:solidFill>
+                  <a:srgbClr val="FDBF2D"/>
+                </a:solidFill>
+                <a:latin typeface="Microsoft YaHei"/>
+              </a:defRPr>
+            </a:pPr>
+            <a:r>
+              <a:t>惟有主的话永长存</a:t>
+            </a:r>
+          </a:p>
+          <a:p>
+            <a:pPr algn="ctr">
+              <a:lnSpc>
+                <a:spcPts val="7500"/>
+              </a:lnSpc>
+              <a:defRPr sz="5600" b="0">
+                <a:solidFill>
+                  <a:srgbClr val="FDBF2D"/>
+                </a:solidFill>
+                <a:latin typeface="Microsoft YaHei"/>
+              </a:defRPr>
+            </a:pPr>
+            <a:r>
+              <a:t>惟有主的话永长存永长存</a:t>
+            </a:r>
+          </a:p>
+        </p:txBody>
+      </p:sp>
+      <p:sp>
+        <p:nvSpPr>
+          <p:cNvPr id="3" name="TextBox 2"/>
+          <p:cNvSpPr txBox="1"/>
+          <p:nvPr/>
+        </p:nvSpPr>
+        <p:spPr>
+          <a:xfrm>
+            <a:off x="0" y="6480000"/>
+            <a:ext cx="9054000" cy="370800"/>
+          </a:xfrm>
+          <a:prstGeom prst="rect">
+            <a:avLst/>
+          </a:prstGeom>
+          <a:noFill/>
+        </p:spPr>
+        <p:txBody>
+          <a:bodyPr wrap="none">
+            <a:spAutoFit/>
+          </a:bodyPr>
+          <a:lstStyle/>
+          <a:p>
+            <a:pPr algn="r">
+              <a:defRPr sz="2000" b="1">
+                <a:solidFill>
+                  <a:srgbClr val="FDBF2D"/>
+                </a:solidFill>
+                <a:latin typeface="Microsoft YaHei"/>
+              </a:defRPr>
+            </a:pPr>
+            <a:r>
+              <a:t>惟有主的话永长存</a:t>
+            </a:r>
+          </a:p>
+        </p:txBody>
+      </p:sp>
+    </p:spTree>
+  </p:cSld>
+  <p:clrMapOvr>
+    <a:masterClrMapping/>
+  </p:clrMapOvr>
+</p:sld>
+</file>
+
 <file path=ppt/slides/slide2.xml><?xml version="1.0" encoding="utf-8"?>
 <p:sld xmlns:a="http://schemas.openxmlformats.org/drawingml/2006/main" xmlns:p="http://schemas.openxmlformats.org/presentationml/2006/main" xmlns:r="http://schemas.openxmlformats.org/officeDocument/2006/relationships">
   <p:cSld>
@@ -3660,7 +3767,7 @@
               </a:defRPr>
             </a:pPr>
             <a:r>
-              <a:t>阿爸阿爸父</a:t>
+              <a:t>阿爸阿爸父阿爸阿爸父</a:t>
             </a:r>
           </a:p>
           <a:p>
@@ -3676,7 +3783,7 @@
               </a:defRPr>
             </a:pPr>
             <a:r>
-              <a:t>教会啊你要兴起</a:t>
+              <a:t>时常帮助我</a:t>
             </a:r>
           </a:p>
           <a:p>
@@ -3692,7 +3799,7 @@
               </a:defRPr>
             </a:pPr>
             <a:r>
-              <a:t>惟有主的话永长存</a:t>
+              <a:t>并赐力量的阿爸父</a:t>
             </a:r>
           </a:p>
         </p:txBody>
@@ -3728,7 +3835,1033 @@
               </a:defRPr>
             </a:pPr>
             <a:r>
-              <a:t>testtestsetstst</a:t>
+              <a:t>阿爸阿爸父</a:t>
+            </a:r>
+          </a:p>
+        </p:txBody>
+      </p:sp>
+    </p:spTree>
+  </p:cSld>
+  <p:clrMapOvr>
+    <a:masterClrMapping/>
+  </p:clrMapOvr>
+</p:sld>
+</file>
+
+<file path=ppt/slides/slide3.xml><?xml version="1.0" encoding="utf-8"?>
+<p:sld xmlns:a="http://schemas.openxmlformats.org/drawingml/2006/main" xmlns:p="http://schemas.openxmlformats.org/presentationml/2006/main" xmlns:r="http://schemas.openxmlformats.org/officeDocument/2006/relationships">
+  <p:cSld>
+    <p:spTree>
+      <p:nvGrpSpPr>
+        <p:cNvPr id="1" name=""/>
+        <p:cNvGrpSpPr/>
+        <p:nvPr/>
+      </p:nvGrpSpPr>
+      <p:grpSpPr/>
+      <p:sp>
+        <p:nvSpPr>
+          <p:cNvPr id="2" name="TextBox 1"/>
+          <p:cNvSpPr txBox="1"/>
+          <p:nvPr/>
+        </p:nvSpPr>
+        <p:spPr>
+          <a:xfrm>
+            <a:off x="129600" y="1224000"/>
+            <a:ext cx="8892000" cy="1080000"/>
+          </a:xfrm>
+          <a:prstGeom prst="rect">
+            <a:avLst/>
+          </a:prstGeom>
+          <a:noFill/>
+        </p:spPr>
+        <p:txBody>
+          <a:bodyPr wrap="none">
+            <a:spAutoFit/>
+          </a:bodyPr>
+          <a:lstStyle/>
+          <a:p/>
+          <a:p>
+            <a:pPr algn="ctr">
+              <a:lnSpc>
+                <a:spcPts val="7500"/>
+              </a:lnSpc>
+              <a:defRPr sz="5600" b="0">
+                <a:solidFill>
+                  <a:srgbClr val="FDBF2D"/>
+                </a:solidFill>
+                <a:latin typeface="Microsoft YaHei"/>
+              </a:defRPr>
+            </a:pPr>
+            <a:r>
+              <a:t>医治忧伤破碎的心灵</a:t>
+            </a:r>
+          </a:p>
+          <a:p>
+            <a:pPr algn="ctr">
+              <a:lnSpc>
+                <a:spcPts val="7500"/>
+              </a:lnSpc>
+              <a:defRPr sz="5600" b="0">
+                <a:solidFill>
+                  <a:srgbClr val="FDBF2D"/>
+                </a:solidFill>
+                <a:latin typeface="Microsoft YaHei"/>
+              </a:defRPr>
+            </a:pPr>
+            <a:r>
+              <a:t>缠裹无法忍受的伤痛</a:t>
+            </a:r>
+          </a:p>
+          <a:p>
+            <a:pPr algn="ctr">
+              <a:lnSpc>
+                <a:spcPts val="7500"/>
+              </a:lnSpc>
+              <a:defRPr sz="5600" b="0">
+                <a:solidFill>
+                  <a:srgbClr val="FDBF2D"/>
+                </a:solidFill>
+                <a:latin typeface="Microsoft YaHei"/>
+              </a:defRPr>
+            </a:pPr>
+            <a:r>
+              <a:t>因祂认识我因祂深切了解我</a:t>
+            </a:r>
+          </a:p>
+          <a:p>
+            <a:pPr algn="ctr">
+              <a:lnSpc>
+                <a:spcPts val="7500"/>
+              </a:lnSpc>
+              <a:defRPr sz="5600" b="0">
+                <a:solidFill>
+                  <a:srgbClr val="FDBF2D"/>
+                </a:solidFill>
+                <a:latin typeface="Microsoft YaHei"/>
+              </a:defRPr>
+            </a:pPr>
+            <a:r>
+              <a:t>祂使我的灵魂重新得力</a:t>
+            </a:r>
+          </a:p>
+        </p:txBody>
+      </p:sp>
+      <p:sp>
+        <p:nvSpPr>
+          <p:cNvPr id="3" name="TextBox 2"/>
+          <p:cNvSpPr txBox="1"/>
+          <p:nvPr/>
+        </p:nvSpPr>
+        <p:spPr>
+          <a:xfrm>
+            <a:off x="0" y="6480000"/>
+            <a:ext cx="9054000" cy="370800"/>
+          </a:xfrm>
+          <a:prstGeom prst="rect">
+            <a:avLst/>
+          </a:prstGeom>
+          <a:noFill/>
+        </p:spPr>
+        <p:txBody>
+          <a:bodyPr wrap="none">
+            <a:spAutoFit/>
+          </a:bodyPr>
+          <a:lstStyle/>
+          <a:p>
+            <a:pPr algn="r">
+              <a:defRPr sz="2000" b="1">
+                <a:solidFill>
+                  <a:srgbClr val="FDBF2D"/>
+                </a:solidFill>
+                <a:latin typeface="Microsoft YaHei"/>
+              </a:defRPr>
+            </a:pPr>
+            <a:r>
+              <a:t>阿爸阿爸父</a:t>
+            </a:r>
+          </a:p>
+        </p:txBody>
+      </p:sp>
+    </p:spTree>
+  </p:cSld>
+  <p:clrMapOvr>
+    <a:masterClrMapping/>
+  </p:clrMapOvr>
+</p:sld>
+</file>
+
+<file path=ppt/slides/slide4.xml><?xml version="1.0" encoding="utf-8"?>
+<p:sld xmlns:a="http://schemas.openxmlformats.org/drawingml/2006/main" xmlns:p="http://schemas.openxmlformats.org/presentationml/2006/main" xmlns:r="http://schemas.openxmlformats.org/officeDocument/2006/relationships">
+  <p:cSld>
+    <p:spTree>
+      <p:nvGrpSpPr>
+        <p:cNvPr id="1" name=""/>
+        <p:cNvGrpSpPr/>
+        <p:nvPr/>
+      </p:nvGrpSpPr>
+      <p:grpSpPr/>
+      <p:sp>
+        <p:nvSpPr>
+          <p:cNvPr id="2" name="TextBox 1"/>
+          <p:cNvSpPr txBox="1"/>
+          <p:nvPr/>
+        </p:nvSpPr>
+        <p:spPr>
+          <a:xfrm>
+            <a:off x="129600" y="1224000"/>
+            <a:ext cx="8892000" cy="1080000"/>
+          </a:xfrm>
+          <a:prstGeom prst="rect">
+            <a:avLst/>
+          </a:prstGeom>
+          <a:noFill/>
+        </p:spPr>
+        <p:txBody>
+          <a:bodyPr wrap="none">
+            <a:spAutoFit/>
+          </a:bodyPr>
+          <a:lstStyle/>
+          <a:p/>
+          <a:p>
+            <a:pPr algn="ctr">
+              <a:lnSpc>
+                <a:spcPts val="7500"/>
+              </a:lnSpc>
+              <a:defRPr sz="5600" b="0">
+                <a:solidFill>
+                  <a:srgbClr val="FDBF2D"/>
+                </a:solidFill>
+                <a:latin typeface="Microsoft YaHei"/>
+              </a:defRPr>
+            </a:pPr>
+            <a:r>
+              <a:t>教会啊你要兴起</a:t>
+            </a:r>
+          </a:p>
+          <a:p>
+            <a:pPr algn="ctr">
+              <a:lnSpc>
+                <a:spcPts val="7500"/>
+              </a:lnSpc>
+              <a:defRPr sz="5600" b="0">
+                <a:solidFill>
+                  <a:srgbClr val="FDBF2D"/>
+                </a:solidFill>
+                <a:latin typeface="Microsoft YaHei"/>
+              </a:defRPr>
+            </a:pPr>
+            <a:r>
+              <a:t>我主正在呼召你</a:t>
+            </a:r>
+          </a:p>
+          <a:p>
+            <a:pPr algn="ctr">
+              <a:lnSpc>
+                <a:spcPts val="7500"/>
+              </a:lnSpc>
+              <a:defRPr sz="5600" b="0">
+                <a:solidFill>
+                  <a:srgbClr val="FDBF2D"/>
+                </a:solidFill>
+                <a:latin typeface="Microsoft YaHei"/>
+              </a:defRPr>
+            </a:pPr>
+            <a:r>
+              <a:t>放下失败交托一切恐惧</a:t>
+            </a:r>
+          </a:p>
+          <a:p>
+            <a:pPr algn="ctr">
+              <a:lnSpc>
+                <a:spcPts val="7500"/>
+              </a:lnSpc>
+              <a:defRPr sz="5600" b="0">
+                <a:solidFill>
+                  <a:srgbClr val="FDBF2D"/>
+                </a:solidFill>
+                <a:latin typeface="Microsoft YaHei"/>
+              </a:defRPr>
+            </a:pPr>
+            <a:r>
+              <a:t>教会啊你要兴起</a:t>
+            </a:r>
+          </a:p>
+        </p:txBody>
+      </p:sp>
+      <p:sp>
+        <p:nvSpPr>
+          <p:cNvPr id="3" name="TextBox 2"/>
+          <p:cNvSpPr txBox="1"/>
+          <p:nvPr/>
+        </p:nvSpPr>
+        <p:spPr>
+          <a:xfrm>
+            <a:off x="0" y="6480000"/>
+            <a:ext cx="9054000" cy="370800"/>
+          </a:xfrm>
+          <a:prstGeom prst="rect">
+            <a:avLst/>
+          </a:prstGeom>
+          <a:noFill/>
+        </p:spPr>
+        <p:txBody>
+          <a:bodyPr wrap="none">
+            <a:spAutoFit/>
+          </a:bodyPr>
+          <a:lstStyle/>
+          <a:p>
+            <a:pPr algn="r">
+              <a:defRPr sz="2000" b="1">
+                <a:solidFill>
+                  <a:srgbClr val="FDBF2D"/>
+                </a:solidFill>
+                <a:latin typeface="Microsoft YaHei"/>
+              </a:defRPr>
+            </a:pPr>
+            <a:r>
+              <a:t>教会啊你要兴起</a:t>
+            </a:r>
+          </a:p>
+        </p:txBody>
+      </p:sp>
+    </p:spTree>
+  </p:cSld>
+  <p:clrMapOvr>
+    <a:masterClrMapping/>
+  </p:clrMapOvr>
+</p:sld>
+</file>
+
+<file path=ppt/slides/slide5.xml><?xml version="1.0" encoding="utf-8"?>
+<p:sld xmlns:a="http://schemas.openxmlformats.org/drawingml/2006/main" xmlns:p="http://schemas.openxmlformats.org/presentationml/2006/main" xmlns:r="http://schemas.openxmlformats.org/officeDocument/2006/relationships">
+  <p:cSld>
+    <p:spTree>
+      <p:nvGrpSpPr>
+        <p:cNvPr id="1" name=""/>
+        <p:cNvGrpSpPr/>
+        <p:nvPr/>
+      </p:nvGrpSpPr>
+      <p:grpSpPr/>
+      <p:sp>
+        <p:nvSpPr>
+          <p:cNvPr id="2" name="TextBox 1"/>
+          <p:cNvSpPr txBox="1"/>
+          <p:nvPr/>
+        </p:nvSpPr>
+        <p:spPr>
+          <a:xfrm>
+            <a:off x="129600" y="1224000"/>
+            <a:ext cx="8892000" cy="1080000"/>
+          </a:xfrm>
+          <a:prstGeom prst="rect">
+            <a:avLst/>
+          </a:prstGeom>
+          <a:noFill/>
+        </p:spPr>
+        <p:txBody>
+          <a:bodyPr wrap="none">
+            <a:spAutoFit/>
+          </a:bodyPr>
+          <a:lstStyle/>
+          <a:p/>
+          <a:p>
+            <a:pPr algn="ctr">
+              <a:lnSpc>
+                <a:spcPts val="7500"/>
+              </a:lnSpc>
+              <a:defRPr sz="5600" b="0">
+                <a:solidFill>
+                  <a:srgbClr val="FDBF2D"/>
+                </a:solidFill>
+                <a:latin typeface="Microsoft YaHei"/>
+              </a:defRPr>
+            </a:pPr>
+            <a:r>
+              <a:t>教会啊你要兴起</a:t>
+            </a:r>
+          </a:p>
+          <a:p>
+            <a:pPr algn="ctr">
+              <a:lnSpc>
+                <a:spcPts val="7500"/>
+              </a:lnSpc>
+              <a:defRPr sz="5600" b="0">
+                <a:solidFill>
+                  <a:srgbClr val="FDBF2D"/>
+                </a:solidFill>
+                <a:latin typeface="Microsoft YaHei"/>
+              </a:defRPr>
+            </a:pPr>
+            <a:r>
+              <a:t>我主正在差遣你</a:t>
+            </a:r>
+          </a:p>
+          <a:p>
+            <a:pPr algn="ctr">
+              <a:lnSpc>
+                <a:spcPts val="7500"/>
+              </a:lnSpc>
+              <a:defRPr sz="5600" b="0">
+                <a:solidFill>
+                  <a:srgbClr val="FDBF2D"/>
+                </a:solidFill>
+                <a:latin typeface="Microsoft YaHei"/>
+              </a:defRPr>
+            </a:pPr>
+            <a:r>
+              <a:t>神呼召我们进入祂的命定</a:t>
+            </a:r>
+          </a:p>
+          <a:p>
+            <a:pPr algn="ctr">
+              <a:lnSpc>
+                <a:spcPts val="7500"/>
+              </a:lnSpc>
+              <a:defRPr sz="5600" b="0">
+                <a:solidFill>
+                  <a:srgbClr val="FDBF2D"/>
+                </a:solidFill>
+                <a:latin typeface="Microsoft YaHei"/>
+              </a:defRPr>
+            </a:pPr>
+            <a:r>
+              <a:t>教会啊你要兴起</a:t>
+            </a:r>
+          </a:p>
+        </p:txBody>
+      </p:sp>
+      <p:sp>
+        <p:nvSpPr>
+          <p:cNvPr id="3" name="TextBox 2"/>
+          <p:cNvSpPr txBox="1"/>
+          <p:nvPr/>
+        </p:nvSpPr>
+        <p:spPr>
+          <a:xfrm>
+            <a:off x="0" y="6480000"/>
+            <a:ext cx="9054000" cy="370800"/>
+          </a:xfrm>
+          <a:prstGeom prst="rect">
+            <a:avLst/>
+          </a:prstGeom>
+          <a:noFill/>
+        </p:spPr>
+        <p:txBody>
+          <a:bodyPr wrap="none">
+            <a:spAutoFit/>
+          </a:bodyPr>
+          <a:lstStyle/>
+          <a:p>
+            <a:pPr algn="r">
+              <a:defRPr sz="2000" b="1">
+                <a:solidFill>
+                  <a:srgbClr val="FDBF2D"/>
+                </a:solidFill>
+                <a:latin typeface="Microsoft YaHei"/>
+              </a:defRPr>
+            </a:pPr>
+            <a:r>
+              <a:t>教会啊你要兴起</a:t>
+            </a:r>
+          </a:p>
+        </p:txBody>
+      </p:sp>
+    </p:spTree>
+  </p:cSld>
+  <p:clrMapOvr>
+    <a:masterClrMapping/>
+  </p:clrMapOvr>
+</p:sld>
+</file>
+
+<file path=ppt/slides/slide6.xml><?xml version="1.0" encoding="utf-8"?>
+<p:sld xmlns:a="http://schemas.openxmlformats.org/drawingml/2006/main" xmlns:p="http://schemas.openxmlformats.org/presentationml/2006/main" xmlns:r="http://schemas.openxmlformats.org/officeDocument/2006/relationships">
+  <p:cSld>
+    <p:spTree>
+      <p:nvGrpSpPr>
+        <p:cNvPr id="1" name=""/>
+        <p:cNvGrpSpPr/>
+        <p:nvPr/>
+      </p:nvGrpSpPr>
+      <p:grpSpPr/>
+      <p:sp>
+        <p:nvSpPr>
+          <p:cNvPr id="2" name="TextBox 1"/>
+          <p:cNvSpPr txBox="1"/>
+          <p:nvPr/>
+        </p:nvSpPr>
+        <p:spPr>
+          <a:xfrm>
+            <a:off x="129600" y="1224000"/>
+            <a:ext cx="8892000" cy="1080000"/>
+          </a:xfrm>
+          <a:prstGeom prst="rect">
+            <a:avLst/>
+          </a:prstGeom>
+          <a:noFill/>
+        </p:spPr>
+        <p:txBody>
+          <a:bodyPr wrap="none">
+            <a:spAutoFit/>
+          </a:bodyPr>
+          <a:lstStyle/>
+          <a:p/>
+          <a:p>
+            <a:pPr algn="ctr">
+              <a:lnSpc>
+                <a:spcPts val="7500"/>
+              </a:lnSpc>
+              <a:defRPr sz="5600" b="0">
+                <a:solidFill>
+                  <a:srgbClr val="FDBF2D"/>
+                </a:solidFill>
+                <a:latin typeface="Microsoft YaHei"/>
+              </a:defRPr>
+            </a:pPr>
+            <a:r>
+              <a:t>我们是世上光（照亮一切黑暗）</a:t>
+            </a:r>
+          </a:p>
+          <a:p>
+            <a:pPr algn="ctr">
+              <a:lnSpc>
+                <a:spcPts val="7500"/>
+              </a:lnSpc>
+              <a:defRPr sz="5600" b="0">
+                <a:solidFill>
+                  <a:srgbClr val="FDBF2D"/>
+                </a:solidFill>
+                <a:latin typeface="Microsoft YaHei"/>
+              </a:defRPr>
+            </a:pPr>
+            <a:r>
+              <a:t>属神的推荐信（彰显神的荣耀）</a:t>
+            </a:r>
+          </a:p>
+          <a:p>
+            <a:pPr algn="ctr">
+              <a:lnSpc>
+                <a:spcPts val="7500"/>
+              </a:lnSpc>
+              <a:defRPr sz="5600" b="0">
+                <a:solidFill>
+                  <a:srgbClr val="FDBF2D"/>
+                </a:solidFill>
+                <a:latin typeface="Microsoft YaHei"/>
+              </a:defRPr>
+            </a:pPr>
+            <a:r>
+              <a:t>经由主的教会（透过我们）</a:t>
+            </a:r>
+          </a:p>
+          <a:p>
+            <a:pPr algn="ctr">
+              <a:lnSpc>
+                <a:spcPts val="7500"/>
+              </a:lnSpc>
+              <a:defRPr sz="5600" b="0">
+                <a:solidFill>
+                  <a:srgbClr val="FDBF2D"/>
+                </a:solidFill>
+                <a:latin typeface="Microsoft YaHei"/>
+              </a:defRPr>
+            </a:pPr>
+            <a:r>
+              <a:t>世界将看见主荣光</a:t>
+            </a:r>
+          </a:p>
+        </p:txBody>
+      </p:sp>
+      <p:sp>
+        <p:nvSpPr>
+          <p:cNvPr id="3" name="TextBox 2"/>
+          <p:cNvSpPr txBox="1"/>
+          <p:nvPr/>
+        </p:nvSpPr>
+        <p:spPr>
+          <a:xfrm>
+            <a:off x="0" y="6480000"/>
+            <a:ext cx="9054000" cy="370800"/>
+          </a:xfrm>
+          <a:prstGeom prst="rect">
+            <a:avLst/>
+          </a:prstGeom>
+          <a:noFill/>
+        </p:spPr>
+        <p:txBody>
+          <a:bodyPr wrap="none">
+            <a:spAutoFit/>
+          </a:bodyPr>
+          <a:lstStyle/>
+          <a:p>
+            <a:pPr algn="r">
+              <a:defRPr sz="2000" b="1">
+                <a:solidFill>
+                  <a:srgbClr val="FDBF2D"/>
+                </a:solidFill>
+                <a:latin typeface="Microsoft YaHei"/>
+              </a:defRPr>
+            </a:pPr>
+            <a:r>
+              <a:t>教会啊你要兴起</a:t>
+            </a:r>
+          </a:p>
+        </p:txBody>
+      </p:sp>
+    </p:spTree>
+  </p:cSld>
+  <p:clrMapOvr>
+    <a:masterClrMapping/>
+  </p:clrMapOvr>
+</p:sld>
+</file>
+
+<file path=ppt/slides/slide7.xml><?xml version="1.0" encoding="utf-8"?>
+<p:sld xmlns:a="http://schemas.openxmlformats.org/drawingml/2006/main" xmlns:p="http://schemas.openxmlformats.org/presentationml/2006/main" xmlns:r="http://schemas.openxmlformats.org/officeDocument/2006/relationships">
+  <p:cSld>
+    <p:spTree>
+      <p:nvGrpSpPr>
+        <p:cNvPr id="1" name=""/>
+        <p:cNvGrpSpPr/>
+        <p:nvPr/>
+      </p:nvGrpSpPr>
+      <p:grpSpPr/>
+      <p:sp>
+        <p:nvSpPr>
+          <p:cNvPr id="2" name="TextBox 1"/>
+          <p:cNvSpPr txBox="1"/>
+          <p:nvPr/>
+        </p:nvSpPr>
+        <p:spPr>
+          <a:xfrm>
+            <a:off x="129600" y="1224000"/>
+            <a:ext cx="8892000" cy="1080000"/>
+          </a:xfrm>
+          <a:prstGeom prst="rect">
+            <a:avLst/>
+          </a:prstGeom>
+          <a:noFill/>
+        </p:spPr>
+        <p:txBody>
+          <a:bodyPr wrap="none">
+            <a:spAutoFit/>
+          </a:bodyPr>
+          <a:lstStyle/>
+          <a:p/>
+          <a:p>
+            <a:pPr algn="ctr">
+              <a:lnSpc>
+                <a:spcPts val="7500"/>
+              </a:lnSpc>
+              <a:defRPr sz="5600" b="0">
+                <a:solidFill>
+                  <a:srgbClr val="FDBF2D"/>
+                </a:solidFill>
+                <a:latin typeface="Microsoft YaHei"/>
+              </a:defRPr>
+            </a:pPr>
+            <a:r>
+              <a:t>你要兴起因着主伟大的爱</a:t>
+            </a:r>
+          </a:p>
+          <a:p>
+            <a:pPr algn="ctr">
+              <a:lnSpc>
+                <a:spcPts val="7500"/>
+              </a:lnSpc>
+              <a:defRPr sz="5600" b="0">
+                <a:solidFill>
+                  <a:srgbClr val="FDBF2D"/>
+                </a:solidFill>
+                <a:latin typeface="Microsoft YaHei"/>
+              </a:defRPr>
+            </a:pPr>
+            <a:r>
+              <a:t>靠着主无限能力</a:t>
+            </a:r>
+          </a:p>
+          <a:p>
+            <a:pPr algn="ctr">
+              <a:lnSpc>
+                <a:spcPts val="7500"/>
+              </a:lnSpc>
+              <a:defRPr sz="5600" b="0">
+                <a:solidFill>
+                  <a:srgbClr val="FDBF2D"/>
+                </a:solidFill>
+                <a:latin typeface="Microsoft YaHei"/>
+              </a:defRPr>
+            </a:pPr>
+            <a:r>
+              <a:t>彼此合而为一</a:t>
+            </a:r>
+          </a:p>
+          <a:p>
+            <a:pPr algn="ctr">
+              <a:lnSpc>
+                <a:spcPts val="7500"/>
+              </a:lnSpc>
+              <a:defRPr sz="5600" b="0">
+                <a:solidFill>
+                  <a:srgbClr val="FDBF2D"/>
+                </a:solidFill>
+                <a:latin typeface="Microsoft YaHei"/>
+              </a:defRPr>
+            </a:pPr>
+            <a:r>
+              <a:t>彰显神的能力</a:t>
+            </a:r>
+          </a:p>
+        </p:txBody>
+      </p:sp>
+      <p:sp>
+        <p:nvSpPr>
+          <p:cNvPr id="3" name="TextBox 2"/>
+          <p:cNvSpPr txBox="1"/>
+          <p:nvPr/>
+        </p:nvSpPr>
+        <p:spPr>
+          <a:xfrm>
+            <a:off x="0" y="6480000"/>
+            <a:ext cx="9054000" cy="370800"/>
+          </a:xfrm>
+          <a:prstGeom prst="rect">
+            <a:avLst/>
+          </a:prstGeom>
+          <a:noFill/>
+        </p:spPr>
+        <p:txBody>
+          <a:bodyPr wrap="none">
+            <a:spAutoFit/>
+          </a:bodyPr>
+          <a:lstStyle/>
+          <a:p>
+            <a:pPr algn="r">
+              <a:defRPr sz="2000" b="1">
+                <a:solidFill>
+                  <a:srgbClr val="FDBF2D"/>
+                </a:solidFill>
+                <a:latin typeface="Microsoft YaHei"/>
+              </a:defRPr>
+            </a:pPr>
+            <a:r>
+              <a:t>教会啊你要兴起</a:t>
+            </a:r>
+          </a:p>
+        </p:txBody>
+      </p:sp>
+    </p:spTree>
+  </p:cSld>
+  <p:clrMapOvr>
+    <a:masterClrMapping/>
+  </p:clrMapOvr>
+</p:sld>
+</file>
+
+<file path=ppt/slides/slide8.xml><?xml version="1.0" encoding="utf-8"?>
+<p:sld xmlns:a="http://schemas.openxmlformats.org/drawingml/2006/main" xmlns:p="http://schemas.openxmlformats.org/presentationml/2006/main" xmlns:r="http://schemas.openxmlformats.org/officeDocument/2006/relationships">
+  <p:cSld>
+    <p:spTree>
+      <p:nvGrpSpPr>
+        <p:cNvPr id="1" name=""/>
+        <p:cNvGrpSpPr/>
+        <p:nvPr/>
+      </p:nvGrpSpPr>
+      <p:grpSpPr/>
+      <p:sp>
+        <p:nvSpPr>
+          <p:cNvPr id="2" name="TextBox 1"/>
+          <p:cNvSpPr txBox="1"/>
+          <p:nvPr/>
+        </p:nvSpPr>
+        <p:spPr>
+          <a:xfrm>
+            <a:off x="129600" y="1224000"/>
+            <a:ext cx="8892000" cy="1080000"/>
+          </a:xfrm>
+          <a:prstGeom prst="rect">
+            <a:avLst/>
+          </a:prstGeom>
+          <a:noFill/>
+        </p:spPr>
+        <p:txBody>
+          <a:bodyPr wrap="none">
+            <a:spAutoFit/>
+          </a:bodyPr>
+          <a:lstStyle/>
+          <a:p/>
+          <a:p>
+            <a:pPr algn="ctr">
+              <a:lnSpc>
+                <a:spcPts val="7500"/>
+              </a:lnSpc>
+              <a:defRPr sz="5600" b="0">
+                <a:solidFill>
+                  <a:srgbClr val="FDBF2D"/>
+                </a:solidFill>
+                <a:latin typeface="Microsoft YaHei"/>
+              </a:defRPr>
+            </a:pPr>
+            <a:r>
+              <a:t>芳草必枯干花朵必凋谢</a:t>
+            </a:r>
+          </a:p>
+          <a:p>
+            <a:pPr algn="ctr">
+              <a:lnSpc>
+                <a:spcPts val="7500"/>
+              </a:lnSpc>
+              <a:defRPr sz="5600" b="0">
+                <a:solidFill>
+                  <a:srgbClr val="FDBF2D"/>
+                </a:solidFill>
+                <a:latin typeface="Microsoft YaHei"/>
+              </a:defRPr>
+            </a:pPr>
+            <a:r>
+              <a:t>惟有主的话永长存</a:t>
+            </a:r>
+          </a:p>
+          <a:p>
+            <a:pPr algn="ctr">
+              <a:lnSpc>
+                <a:spcPts val="7500"/>
+              </a:lnSpc>
+              <a:defRPr sz="5600" b="0">
+                <a:solidFill>
+                  <a:srgbClr val="FDBF2D"/>
+                </a:solidFill>
+                <a:latin typeface="Microsoft YaHei"/>
+              </a:defRPr>
+            </a:pPr>
+            <a:r>
+              <a:t>芳草必枯干花朵必凋谢</a:t>
+            </a:r>
+          </a:p>
+          <a:p>
+            <a:pPr algn="ctr">
+              <a:lnSpc>
+                <a:spcPts val="7500"/>
+              </a:lnSpc>
+              <a:defRPr sz="5600" b="0">
+                <a:solidFill>
+                  <a:srgbClr val="FDBF2D"/>
+                </a:solidFill>
+                <a:latin typeface="Microsoft YaHei"/>
+              </a:defRPr>
+            </a:pPr>
+            <a:r>
+              <a:t>惟有主的话永长存</a:t>
+            </a:r>
+          </a:p>
+          <a:p>
+            <a:pPr algn="ctr">
+              <a:lnSpc>
+                <a:spcPts val="7500"/>
+              </a:lnSpc>
+              <a:defRPr sz="5600" b="0">
+                <a:solidFill>
+                  <a:srgbClr val="FDBF2D"/>
+                </a:solidFill>
+                <a:latin typeface="Microsoft YaHei"/>
+              </a:defRPr>
+            </a:pPr>
+            <a:r>
+              <a:t>芳草必枯干花朵必凋谢</a:t>
+            </a:r>
+          </a:p>
+          <a:p>
+            <a:pPr algn="ctr">
+              <a:lnSpc>
+                <a:spcPts val="7500"/>
+              </a:lnSpc>
+              <a:defRPr sz="5600" b="0">
+                <a:solidFill>
+                  <a:srgbClr val="FDBF2D"/>
+                </a:solidFill>
+                <a:latin typeface="Microsoft YaHei"/>
+              </a:defRPr>
+            </a:pPr>
+            <a:r>
+              <a:t>惟有主的话永长存</a:t>
+            </a:r>
+          </a:p>
+        </p:txBody>
+      </p:sp>
+      <p:sp>
+        <p:nvSpPr>
+          <p:cNvPr id="3" name="TextBox 2"/>
+          <p:cNvSpPr txBox="1"/>
+          <p:nvPr/>
+        </p:nvSpPr>
+        <p:spPr>
+          <a:xfrm>
+            <a:off x="0" y="6480000"/>
+            <a:ext cx="9054000" cy="370800"/>
+          </a:xfrm>
+          <a:prstGeom prst="rect">
+            <a:avLst/>
+          </a:prstGeom>
+          <a:noFill/>
+        </p:spPr>
+        <p:txBody>
+          <a:bodyPr wrap="none">
+            <a:spAutoFit/>
+          </a:bodyPr>
+          <a:lstStyle/>
+          <a:p>
+            <a:pPr algn="r">
+              <a:defRPr sz="2000" b="1">
+                <a:solidFill>
+                  <a:srgbClr val="FDBF2D"/>
+                </a:solidFill>
+                <a:latin typeface="Microsoft YaHei"/>
+              </a:defRPr>
+            </a:pPr>
+            <a:r>
+              <a:t>惟有主的话永长存</a:t>
+            </a:r>
+          </a:p>
+        </p:txBody>
+      </p:sp>
+    </p:spTree>
+  </p:cSld>
+  <p:clrMapOvr>
+    <a:masterClrMapping/>
+  </p:clrMapOvr>
+</p:sld>
+</file>
+
+<file path=ppt/slides/slide9.xml><?xml version="1.0" encoding="utf-8"?>
+<p:sld xmlns:a="http://schemas.openxmlformats.org/drawingml/2006/main" xmlns:p="http://schemas.openxmlformats.org/presentationml/2006/main" xmlns:r="http://schemas.openxmlformats.org/officeDocument/2006/relationships">
+  <p:cSld>
+    <p:spTree>
+      <p:nvGrpSpPr>
+        <p:cNvPr id="1" name=""/>
+        <p:cNvGrpSpPr/>
+        <p:nvPr/>
+      </p:nvGrpSpPr>
+      <p:grpSpPr/>
+      <p:sp>
+        <p:nvSpPr>
+          <p:cNvPr id="2" name="TextBox 1"/>
+          <p:cNvSpPr txBox="1"/>
+          <p:nvPr/>
+        </p:nvSpPr>
+        <p:spPr>
+          <a:xfrm>
+            <a:off x="129600" y="1224000"/>
+            <a:ext cx="8892000" cy="1080000"/>
+          </a:xfrm>
+          <a:prstGeom prst="rect">
+            <a:avLst/>
+          </a:prstGeom>
+          <a:noFill/>
+        </p:spPr>
+        <p:txBody>
+          <a:bodyPr wrap="none">
+            <a:spAutoFit/>
+          </a:bodyPr>
+          <a:lstStyle/>
+          <a:p/>
+          <a:p>
+            <a:pPr algn="ctr">
+              <a:lnSpc>
+                <a:spcPts val="7500"/>
+              </a:lnSpc>
+              <a:defRPr sz="5600" b="0">
+                <a:solidFill>
+                  <a:srgbClr val="FDBF2D"/>
+                </a:solidFill>
+                <a:latin typeface="Microsoft YaHei"/>
+              </a:defRPr>
+            </a:pPr>
+            <a:r>
+              <a:t>凡愿意相信主话的人</a:t>
+            </a:r>
+          </a:p>
+          <a:p>
+            <a:pPr algn="ctr">
+              <a:lnSpc>
+                <a:spcPts val="7500"/>
+              </a:lnSpc>
+              <a:defRPr sz="5600" b="0">
+                <a:solidFill>
+                  <a:srgbClr val="FDBF2D"/>
+                </a:solidFill>
+                <a:latin typeface="Microsoft YaHei"/>
+              </a:defRPr>
+            </a:pPr>
+            <a:r>
+              <a:t>他必定能够得救恩</a:t>
+            </a:r>
+          </a:p>
+          <a:p>
+            <a:pPr algn="ctr">
+              <a:lnSpc>
+                <a:spcPts val="7500"/>
+              </a:lnSpc>
+              <a:defRPr sz="5600" b="0">
+                <a:solidFill>
+                  <a:srgbClr val="FDBF2D"/>
+                </a:solidFill>
+                <a:latin typeface="Microsoft YaHei"/>
+              </a:defRPr>
+            </a:pPr>
+            <a:r>
+              <a:t>凡愿意遵行主话的人</a:t>
+            </a:r>
+          </a:p>
+          <a:p>
+            <a:pPr algn="ctr">
+              <a:lnSpc>
+                <a:spcPts val="7500"/>
+              </a:lnSpc>
+              <a:defRPr sz="5600" b="0">
+                <a:solidFill>
+                  <a:srgbClr val="FDBF2D"/>
+                </a:solidFill>
+                <a:latin typeface="Microsoft YaHei"/>
+              </a:defRPr>
+            </a:pPr>
+            <a:r>
+              <a:t>他必要看见主耶稣大能</a:t>
+            </a:r>
+          </a:p>
+        </p:txBody>
+      </p:sp>
+      <p:sp>
+        <p:nvSpPr>
+          <p:cNvPr id="3" name="TextBox 2"/>
+          <p:cNvSpPr txBox="1"/>
+          <p:nvPr/>
+        </p:nvSpPr>
+        <p:spPr>
+          <a:xfrm>
+            <a:off x="0" y="6480000"/>
+            <a:ext cx="9054000" cy="370800"/>
+          </a:xfrm>
+          <a:prstGeom prst="rect">
+            <a:avLst/>
+          </a:prstGeom>
+          <a:noFill/>
+        </p:spPr>
+        <p:txBody>
+          <a:bodyPr wrap="none">
+            <a:spAutoFit/>
+          </a:bodyPr>
+          <a:lstStyle/>
+          <a:p>
+            <a:pPr algn="r">
+              <a:defRPr sz="2000" b="1">
+                <a:solidFill>
+                  <a:srgbClr val="FDBF2D"/>
+                </a:solidFill>
+                <a:latin typeface="Microsoft YaHei"/>
+              </a:defRPr>
+            </a:pPr>
+            <a:r>
+              <a:t>惟有主的话永长存</a:t>
             </a:r>
           </a:p>
         </p:txBody>

</xml_diff>